<commit_message>
Update PYTHON_5_Operators in Python.pptx
</commit_message>
<xml_diff>
--- a/PYTHON_5_Operators in Python.pptx
+++ b/PYTHON_5_Operators in Python.pptx
@@ -299,7 +299,7 @@
           <a:p>
             <a:fld id="{D3853345-A581-455E-9661-1270F4F6E587}" type="datetimeFigureOut">
               <a:rPr lang="en-US" smtClean="0"/>
-              <a:t>7/1/2019</a:t>
+              <a:t>7/2/2019</a:t>
             </a:fld>
             <a:endParaRPr lang="en-US"/>
           </a:p>
@@ -502,7 +502,7 @@
           <a:p>
             <a:fld id="{D3853345-A581-455E-9661-1270F4F6E587}" type="datetimeFigureOut">
               <a:rPr lang="en-US" smtClean="0"/>
-              <a:t>7/1/2019</a:t>
+              <a:t>7/2/2019</a:t>
             </a:fld>
             <a:endParaRPr lang="en-US"/>
           </a:p>
@@ -710,7 +710,7 @@
           <a:p>
             <a:fld id="{D3853345-A581-455E-9661-1270F4F6E587}" type="datetimeFigureOut">
               <a:rPr lang="en-US" smtClean="0"/>
-              <a:t>7/1/2019</a:t>
+              <a:t>7/2/2019</a:t>
             </a:fld>
             <a:endParaRPr lang="en-US"/>
           </a:p>
@@ -908,7 +908,7 @@
           <a:p>
             <a:fld id="{D3853345-A581-455E-9661-1270F4F6E587}" type="datetimeFigureOut">
               <a:rPr lang="en-US" smtClean="0"/>
-              <a:t>7/1/2019</a:t>
+              <a:t>7/2/2019</a:t>
             </a:fld>
             <a:endParaRPr lang="en-US"/>
           </a:p>
@@ -1183,7 +1183,7 @@
           <a:p>
             <a:fld id="{D3853345-A581-455E-9661-1270F4F6E587}" type="datetimeFigureOut">
               <a:rPr lang="en-US" smtClean="0"/>
-              <a:t>7/1/2019</a:t>
+              <a:t>7/2/2019</a:t>
             </a:fld>
             <a:endParaRPr lang="en-US"/>
           </a:p>
@@ -1448,7 +1448,7 @@
           <a:p>
             <a:fld id="{D3853345-A581-455E-9661-1270F4F6E587}" type="datetimeFigureOut">
               <a:rPr lang="en-US" smtClean="0"/>
-              <a:t>7/1/2019</a:t>
+              <a:t>7/2/2019</a:t>
             </a:fld>
             <a:endParaRPr lang="en-US"/>
           </a:p>
@@ -1860,7 +1860,7 @@
           <a:p>
             <a:fld id="{D3853345-A581-455E-9661-1270F4F6E587}" type="datetimeFigureOut">
               <a:rPr lang="en-US" smtClean="0"/>
-              <a:t>7/1/2019</a:t>
+              <a:t>7/2/2019</a:t>
             </a:fld>
             <a:endParaRPr lang="en-US"/>
           </a:p>
@@ -2001,7 +2001,7 @@
           <a:p>
             <a:fld id="{D3853345-A581-455E-9661-1270F4F6E587}" type="datetimeFigureOut">
               <a:rPr lang="en-US" smtClean="0"/>
-              <a:t>7/1/2019</a:t>
+              <a:t>7/2/2019</a:t>
             </a:fld>
             <a:endParaRPr lang="en-US"/>
           </a:p>
@@ -2114,7 +2114,7 @@
           <a:p>
             <a:fld id="{D3853345-A581-455E-9661-1270F4F6E587}" type="datetimeFigureOut">
               <a:rPr lang="en-US" smtClean="0"/>
-              <a:t>7/1/2019</a:t>
+              <a:t>7/2/2019</a:t>
             </a:fld>
             <a:endParaRPr lang="en-US"/>
           </a:p>
@@ -2430,7 +2430,7 @@
           <a:p>
             <a:fld id="{D3853345-A581-455E-9661-1270F4F6E587}" type="datetimeFigureOut">
               <a:rPr lang="en-US" smtClean="0"/>
-              <a:t>7/1/2019</a:t>
+              <a:t>7/2/2019</a:t>
             </a:fld>
             <a:endParaRPr lang="en-US"/>
           </a:p>
@@ -2723,7 +2723,7 @@
           <a:p>
             <a:fld id="{D3853345-A581-455E-9661-1270F4F6E587}" type="datetimeFigureOut">
               <a:rPr lang="en-US" smtClean="0"/>
-              <a:t>7/1/2019</a:t>
+              <a:t>7/2/2019</a:t>
             </a:fld>
             <a:endParaRPr lang="en-US"/>
           </a:p>
@@ -2964,7 +2964,7 @@
           <a:p>
             <a:fld id="{D3853345-A581-455E-9661-1270F4F6E587}" type="datetimeFigureOut">
               <a:rPr lang="en-US" smtClean="0"/>
-              <a:t>7/1/2019</a:t>
+              <a:t>7/2/2019</a:t>
             </a:fld>
             <a:endParaRPr lang="en-US"/>
           </a:p>
@@ -4235,6 +4235,9 @@
           <a:bodyPr/>
           <a:lstStyle/>
           <a:p>
+            <a:pPr marL="0" indent="0">
+              <a:buNone/>
+            </a:pPr>
             <a:r>
               <a:rPr lang="en-US" dirty="0" err="1"/>
               <a:t>money_in_wallet</a:t>
@@ -4245,6 +4248,9 @@
             </a:r>
           </a:p>
           <a:p>
+            <a:pPr marL="0" indent="0">
+              <a:buNone/>
+            </a:pPr>
             <a:r>
               <a:rPr lang="en-US" dirty="0" err="1"/>
               <a:t>sandwich_price</a:t>
@@ -4255,6 +4261,9 @@
             </a:r>
           </a:p>
           <a:p>
+            <a:pPr marL="0" indent="0">
+              <a:buNone/>
+            </a:pPr>
             <a:r>
               <a:rPr lang="en-US" dirty="0" err="1"/>
               <a:t>sales_tax</a:t>
@@ -4273,6 +4282,9 @@
             </a:r>
           </a:p>
           <a:p>
+            <a:pPr marL="0" indent="0">
+              <a:buNone/>
+            </a:pPr>
             <a:r>
               <a:rPr lang="en-US" dirty="0" err="1"/>
               <a:t>sandwich_price</a:t>
@@ -4291,6 +4303,9 @@
             </a:r>
           </a:p>
           <a:p>
+            <a:pPr marL="0" indent="0">
+              <a:buNone/>
+            </a:pPr>
             <a:r>
               <a:rPr lang="en-US" dirty="0" err="1"/>
               <a:t>money_in_wallet</a:t>
@@ -5924,19 +5939,7 @@
           <a:p>
             <a:r>
               <a:rPr lang="en-US" dirty="0"/>
-              <a:t>Examples:</a:t>
-            </a:r>
-          </a:p>
-          <a:p>
-            <a:endParaRPr lang="en-US" dirty="0"/>
-          </a:p>
-          <a:p>
-            <a:pPr marL="0" indent="0">
-              <a:buNone/>
-            </a:pPr>
-            <a:r>
-              <a:rPr lang="en-US" dirty="0"/>
-              <a:t>8 &lt; 15        evaluates to            </a:t>
+              <a:t>Examples: </a:t>
             </a:r>
             <a:r>
               <a:rPr lang="en-US" dirty="0">
@@ -5946,14 +5949,9 @@
               </a:rPr>
               <a:t>True</a:t>
             </a:r>
-          </a:p>
-          <a:p>
-            <a:pPr marL="0" indent="0">
-              <a:buNone/>
-            </a:pPr>
-            <a:r>
-              <a:rPr lang="en-US" dirty="0"/>
-              <a:t>6 != 6         evaluates to              </a:t>
+            <a:r>
+              <a:rPr lang="en-US" dirty="0"/>
+              <a:t> or </a:t>
             </a:r>
             <a:r>
               <a:rPr lang="en-US" dirty="0">
@@ -5963,40 +5961,69 @@
               </a:rPr>
               <a:t>False</a:t>
             </a:r>
-          </a:p>
-          <a:p>
-            <a:pPr marL="0" indent="0">
-              <a:buNone/>
-            </a:pPr>
-            <a:r>
-              <a:rPr lang="en-US" dirty="0"/>
-              <a:t>2.5 &gt; 5.8    evaluates to            </a:t>
-            </a:r>
-            <a:r>
-              <a:rPr lang="en-US" dirty="0">
-                <a:solidFill>
-                  <a:srgbClr val="FF0000"/>
-                </a:solidFill>
-              </a:rPr>
-              <a:t>False</a:t>
-            </a:r>
-          </a:p>
-          <a:p>
-            <a:pPr marL="0" indent="0">
-              <a:buNone/>
-            </a:pPr>
-            <a:r>
-              <a:rPr lang="en-US" dirty="0"/>
-              <a:t>4.0 == 4     evaluates to            </a:t>
-            </a:r>
-            <a:r>
-              <a:rPr lang="en-US" dirty="0">
-                <a:solidFill>
-                  <a:srgbClr val="00B050"/>
-                </a:solidFill>
-              </a:rPr>
-              <a:t>True</a:t>
-            </a:r>
+            <a:r>
+              <a:rPr lang="en-US" dirty="0"/>
+              <a:t> </a:t>
+            </a:r>
+          </a:p>
+          <a:p>
+            <a:endParaRPr lang="en-US" dirty="0"/>
+          </a:p>
+          <a:p>
+            <a:pPr marL="0" indent="0">
+              <a:buNone/>
+            </a:pPr>
+            <a:r>
+              <a:rPr lang="en-US" dirty="0"/>
+              <a:t>8 &lt; 15        evaluates to</a:t>
+            </a:r>
+            <a:endParaRPr lang="en-US" dirty="0">
+              <a:solidFill>
+                <a:srgbClr val="00B050"/>
+              </a:solidFill>
+            </a:endParaRPr>
+          </a:p>
+          <a:p>
+            <a:pPr marL="0" indent="0">
+              <a:buNone/>
+            </a:pPr>
+            <a:r>
+              <a:rPr lang="en-US" dirty="0"/>
+              <a:t>6 != 6         evaluates to</a:t>
+            </a:r>
+            <a:endParaRPr lang="en-US" dirty="0">
+              <a:solidFill>
+                <a:srgbClr val="FF0000"/>
+              </a:solidFill>
+            </a:endParaRPr>
+          </a:p>
+          <a:p>
+            <a:pPr marL="0" indent="0">
+              <a:buNone/>
+            </a:pPr>
+            <a:r>
+              <a:rPr lang="en-US" dirty="0"/>
+              <a:t>2.5 &gt; 5.8    evaluates to</a:t>
+            </a:r>
+            <a:endParaRPr lang="en-US" dirty="0">
+              <a:solidFill>
+                <a:srgbClr val="FF0000"/>
+              </a:solidFill>
+            </a:endParaRPr>
+          </a:p>
+          <a:p>
+            <a:pPr marL="0" indent="0">
+              <a:buNone/>
+            </a:pPr>
+            <a:r>
+              <a:rPr lang="en-US" dirty="0"/>
+              <a:t>4.0 == 4     evaluates to</a:t>
+            </a:r>
+            <a:endParaRPr lang="en-US" dirty="0">
+              <a:solidFill>
+                <a:srgbClr val="00B050"/>
+              </a:solidFill>
+            </a:endParaRPr>
           </a:p>
           <a:p>
             <a:pPr marL="0" indent="0">
@@ -6868,7 +6895,7 @@
           <a:p>
             <a:pPr algn="ctr"/>
             <a:r>
-              <a:rPr lang="en-US" sz="2800" b="1">
+              <a:rPr lang="en-US" sz="3200" b="1" dirty="0">
                 <a:solidFill>
                   <a:schemeClr val="bg1"/>
                 </a:solidFill>
@@ -6907,7 +6934,7 @@
           <a:lstStyle/>
           <a:p>
             <a:r>
-              <a:rPr lang="en-US" sz="2000" dirty="0">
+              <a:rPr lang="en-US" dirty="0">
                 <a:solidFill>
                   <a:schemeClr val="bg1"/>
                 </a:solidFill>
@@ -6920,7 +6947,7 @@
               <a:buNone/>
             </a:pPr>
             <a:r>
-              <a:rPr lang="en-US" sz="2000" dirty="0">
+              <a:rPr lang="en-US" dirty="0">
                 <a:solidFill>
                   <a:schemeClr val="bg1"/>
                 </a:solidFill>
@@ -6928,7 +6955,7 @@
               <a:t>  bool1 = a </a:t>
             </a:r>
             <a:r>
-              <a:rPr lang="en-US" sz="2000" dirty="0">
+              <a:rPr lang="en-US" dirty="0">
                 <a:solidFill>
                   <a:srgbClr val="FF0000"/>
                 </a:solidFill>
@@ -6936,7 +6963,7 @@
               <a:t>and</a:t>
             </a:r>
             <a:r>
-              <a:rPr lang="en-US" sz="2000" dirty="0">
+              <a:rPr lang="en-US" dirty="0">
                 <a:solidFill>
                   <a:schemeClr val="bg1"/>
                 </a:solidFill>
@@ -6946,7 +6973,7 @@
           </a:p>
           <a:p>
             <a:r>
-              <a:rPr lang="en-US" sz="2000" dirty="0">
+              <a:rPr lang="en-US" dirty="0">
                 <a:solidFill>
                   <a:schemeClr val="bg1"/>
                 </a:solidFill>
@@ -7369,27 +7396,39 @@
             </a:r>
           </a:p>
           <a:p>
-            <a:r>
-              <a:rPr lang="en-US" dirty="0"/>
-              <a:t>ex1 = a &lt; b </a:t>
-            </a:r>
-          </a:p>
-          <a:p>
-            <a:r>
-              <a:rPr lang="en-US" dirty="0"/>
-              <a:t>ex2 = a &lt; b and b &lt; c </a:t>
-            </a:r>
-          </a:p>
-          <a:p>
-            <a:r>
-              <a:rPr lang="en-US" dirty="0"/>
-              <a:t>ex3 = (a + b == c) and (b – 10 == a) and (c / 3 == a) </a:t>
-            </a:r>
-          </a:p>
-          <a:p>
-            <a:r>
-              <a:rPr lang="en-US" dirty="0"/>
-              <a:t>print (ex1, ex2, ex3)</a:t>
+            <a:pPr marL="0" indent="0">
+              <a:buNone/>
+            </a:pPr>
+            <a:r>
+              <a:rPr lang="en-US" dirty="0"/>
+              <a:t>   ex1 = a &lt; b </a:t>
+            </a:r>
+          </a:p>
+          <a:p>
+            <a:pPr marL="0" indent="0">
+              <a:buNone/>
+            </a:pPr>
+            <a:r>
+              <a:rPr lang="en-US" dirty="0"/>
+              <a:t>   ex2 = a &lt; b and b &lt; c </a:t>
+            </a:r>
+          </a:p>
+          <a:p>
+            <a:pPr marL="0" indent="0">
+              <a:buNone/>
+            </a:pPr>
+            <a:r>
+              <a:rPr lang="en-US" dirty="0"/>
+              <a:t>   ex3 = (a + b == c) and (b – 10 == a) and (c / 3 == a) </a:t>
+            </a:r>
+          </a:p>
+          <a:p>
+            <a:pPr marL="0" indent="0">
+              <a:buNone/>
+            </a:pPr>
+            <a:r>
+              <a:rPr lang="en-US" dirty="0"/>
+              <a:t>   print (ex1, ex2, ex3)</a:t>
             </a:r>
           </a:p>
           <a:p>
@@ -7587,7 +7626,7 @@
           <a:p>
             <a:pPr algn="ctr"/>
             <a:r>
-              <a:rPr lang="en-US" sz="2600">
+              <a:rPr lang="en-US" sz="3200" b="1" dirty="0">
                 <a:solidFill>
                   <a:srgbClr val="FFFFFF"/>
                 </a:solidFill>
@@ -7675,7 +7714,7 @@
           <a:p>
             <a:r>
               <a:rPr lang="en-US" dirty="0"/>
-              <a:t> For a or b to be True, either a or b must be true</a:t>
+              <a:t>For a or b to be True, either a or b must be true</a:t>
             </a:r>
           </a:p>
           <a:p>

</xml_diff>